<commit_message>
[add] taff dla journee
</commit_message>
<xml_diff>
--- a/Templates/SG.pptx
+++ b/Templates/SG.pptx
@@ -238,7 +238,7 @@
           <a:p>
             <a:fld id="{515CCE07-1711-4DC7-A7D8-7ED312C82FB8}" type="datetimeFigureOut">
               <a:rPr lang="fr-FR" smtClean="0"/>
-              <a:t>27/06/2022</a:t>
+              <a:t>28/06/2022</a:t>
             </a:fld>
             <a:endParaRPr lang="fr-FR"/>
           </a:p>
@@ -403,7 +403,7 @@
           <a:p>
             <a:fld id="{014ABEAC-8B63-4BD1-9569-A14EB8752A94}" type="datetimeFigureOut">
               <a:rPr lang="fr-FR" smtClean="0"/>
-              <a:t>27/06/2022</a:t>
+              <a:t>28/06/2022</a:t>
             </a:fld>
             <a:endParaRPr lang="fr-FR"/>
           </a:p>
@@ -6318,7 +6318,7 @@
           <p:nvPr>
             <p:extLst>
               <p:ext uri="{D42A27DB-BD31-4B8C-83A1-F6EECF244321}">
-                <p14:modId xmlns:p14="http://schemas.microsoft.com/office/powerpoint/2010/main" val="3416251737"/>
+                <p14:modId xmlns:p14="http://schemas.microsoft.com/office/powerpoint/2010/main" val="4207642883"/>
               </p:ext>
             </p:extLst>
           </p:nvPr>
@@ -11405,17 +11405,14 @@
                         <a:buNone/>
                         <a:tabLst/>
                       </a:pPr>
-                      <a:r>
-                        <a:rPr lang="fr-FR" sz="700" b="0" i="0" kern="1200" dirty="0">
-                          <a:solidFill>
-                            <a:schemeClr val="tx1"/>
-                          </a:solidFill>
-                          <a:latin typeface="+mn-lt"/>
-                          <a:ea typeface="+mn-ea"/>
-                          <a:cs typeface="+mn-cs"/>
-                        </a:rPr>
-                        <a:t>&lt;OUI SI APE/ NON SINON&gt;</a:t>
-                      </a:r>
+                      <a:endParaRPr lang="fr-FR" sz="700" b="0" i="0" kern="1200" dirty="0">
+                        <a:solidFill>
+                          <a:schemeClr val="tx1"/>
+                        </a:solidFill>
+                        <a:latin typeface="+mn-lt"/>
+                        <a:ea typeface="+mn-ea"/>
+                        <a:cs typeface="+mn-cs"/>
+                      </a:endParaRPr>
                     </a:p>
                   </a:txBody>
                   <a:tcPr marT="46800" marB="46800" anchor="ctr" horzOverflow="overflow">
@@ -34981,7 +34978,7 @@
                   <a:schemeClr val="tx2"/>
                 </a:solidFill>
               </a:rPr>
-              <a:t>(&lt;NSF&gt; dans cet exemple). Le produit est automatiquement remboursé par anticipation. Il verse alors l’intégralité du capital initial majorée d’un &lt;GC&gt; de &lt;CPN&gt; par &lt;F0&gt; &lt;F2&gt; depuis le &lt;DDCI&gt;, soit un gain de &lt;GCA&gt; dans notre exemple.</a:t>
+              <a:t>(&lt;NSF&gt; dans cet exemple). Le produit est automatiquement remboursé par anticipation. Il verse alors l’intégralité du capital initial majorée d’un &lt;GC&gt; de &lt;CPN&gt; par &lt;F0&gt; &lt;F2&gt; depuis le &lt;DDCI&gt;, soit un gain de &lt;CPR1&gt; dans notre exemple.</a:t>
             </a:r>
           </a:p>
           <a:p>
@@ -35886,27 +35883,6 @@
 </file>
 
 <file path=customXml/item1.xml><?xml version="1.0" encoding="utf-8"?>
-<p:properties xmlns:p="http://schemas.microsoft.com/office/2006/metadata/properties" xmlns:xsi="http://www.w3.org/2001/XMLSchema-instance" xmlns:pc="http://schemas.microsoft.com/office/infopath/2007/PartnerControls">
-  <documentManagement>
-    <_Flow_SignoffStatus xmlns="ef624bc2-1644-4d69-8362-5c28ca496374" xsi:nil="true"/>
-    <TaxCatchAll xmlns="514a554b-82b0-4359-b247-fc84018a95f0" xsi:nil="true"/>
-    <lcf76f155ced4ddcb4097134ff3c332f xmlns="ef624bc2-1644-4d69-8362-5c28ca496374">
-      <Terms xmlns="http://schemas.microsoft.com/office/infopath/2007/PartnerControls"/>
-    </lcf76f155ced4ddcb4097134ff3c332f>
-  </documentManagement>
-</p:properties>
-</file>
-
-<file path=customXml/item2.xml><?xml version="1.0" encoding="utf-8"?>
-<?mso-contentType ?>
-<FormTemplates xmlns="http://schemas.microsoft.com/sharepoint/v3/contenttype/forms">
-  <Display>DocumentLibraryForm</Display>
-  <Edit>DocumentLibraryForm</Edit>
-  <New>DocumentLibraryForm</New>
-</FormTemplates>
-</file>
-
-<file path=customXml/item3.xml><?xml version="1.0" encoding="utf-8"?>
 <ct:contentTypeSchema xmlns:ct="http://schemas.microsoft.com/office/2006/metadata/contentType" xmlns:ma="http://schemas.microsoft.com/office/2006/metadata/properties/metaAttributes" ct:_="" ma:_="" ma:contentTypeName="Document" ma:contentTypeID="0x0101005DDE610BC516E448BB8152259F39635A" ma:contentTypeVersion="17" ma:contentTypeDescription="Crée un document." ma:contentTypeScope="" ma:versionID="bfb75e103009df80b8e5001438c41194">
   <xsd:schema xmlns:xsd="http://www.w3.org/2001/XMLSchema" xmlns:xs="http://www.w3.org/2001/XMLSchema" xmlns:p="http://schemas.microsoft.com/office/2006/metadata/properties" xmlns:ns2="ef624bc2-1644-4d69-8362-5c28ca496374" xmlns:ns3="514a554b-82b0-4359-b247-fc84018a95f0" targetNamespace="http://schemas.microsoft.com/office/2006/metadata/properties" ma:root="true" ma:fieldsID="2ae3df86d13efbb4a35042af2564d386" ns2:_="" ns3:_="">
     <xsd:import namespace="ef624bc2-1644-4d69-8362-5c28ca496374"/>
@@ -36155,7 +36131,47 @@
 </ct:contentTypeSchema>
 </file>
 
+<file path=customXml/item2.xml><?xml version="1.0" encoding="utf-8"?>
+<p:properties xmlns:p="http://schemas.microsoft.com/office/2006/metadata/properties" xmlns:xsi="http://www.w3.org/2001/XMLSchema-instance" xmlns:pc="http://schemas.microsoft.com/office/infopath/2007/PartnerControls">
+  <documentManagement>
+    <_Flow_SignoffStatus xmlns="ef624bc2-1644-4d69-8362-5c28ca496374" xsi:nil="true"/>
+    <TaxCatchAll xmlns="514a554b-82b0-4359-b247-fc84018a95f0" xsi:nil="true"/>
+    <lcf76f155ced4ddcb4097134ff3c332f xmlns="ef624bc2-1644-4d69-8362-5c28ca496374">
+      <Terms xmlns="http://schemas.microsoft.com/office/infopath/2007/PartnerControls"/>
+    </lcf76f155ced4ddcb4097134ff3c332f>
+  </documentManagement>
+</p:properties>
+</file>
+
+<file path=customXml/item3.xml><?xml version="1.0" encoding="utf-8"?>
+<?mso-contentType ?>
+<FormTemplates xmlns="http://schemas.microsoft.com/sharepoint/v3/contenttype/forms">
+  <Display>DocumentLibraryForm</Display>
+  <Edit>DocumentLibraryForm</Edit>
+  <New>DocumentLibraryForm</New>
+</FormTemplates>
+</file>
+
 <file path=customXml/itemProps1.xml><?xml version="1.0" encoding="utf-8"?>
+<ds:datastoreItem xmlns:ds="http://schemas.openxmlformats.org/officeDocument/2006/customXml" ds:itemID="{1952AB1B-D807-48E4-B821-205D428E3F5C}">
+  <ds:schemaRefs>
+    <ds:schemaRef ds:uri="http://schemas.microsoft.com/office/2006/metadata/contentType"/>
+    <ds:schemaRef ds:uri="http://schemas.microsoft.com/office/2006/metadata/properties/metaAttributes"/>
+    <ds:schemaRef ds:uri="http://www.w3.org/2001/XMLSchema"/>
+    <ds:schemaRef ds:uri="http://schemas.microsoft.com/office/2006/metadata/properties"/>
+    <ds:schemaRef ds:uri="ef624bc2-1644-4d69-8362-5c28ca496374"/>
+    <ds:schemaRef ds:uri="514a554b-82b0-4359-b247-fc84018a95f0"/>
+    <ds:schemaRef ds:uri="http://schemas.microsoft.com/office/2006/documentManagement/types"/>
+    <ds:schemaRef ds:uri="http://schemas.microsoft.com/office/infopath/2007/PartnerControls"/>
+    <ds:schemaRef ds:uri="http://schemas.openxmlformats.org/package/2006/metadata/core-properties"/>
+    <ds:schemaRef ds:uri="http://purl.org/dc/elements/1.1/"/>
+    <ds:schemaRef ds:uri="http://purl.org/dc/terms/"/>
+    <ds:schemaRef ds:uri="http://schemas.microsoft.com/internal/obd"/>
+  </ds:schemaRefs>
+</ds:datastoreItem>
+</file>
+
+<file path=customXml/itemProps2.xml><?xml version="1.0" encoding="utf-8"?>
 <ds:datastoreItem xmlns:ds="http://schemas.openxmlformats.org/officeDocument/2006/customXml" ds:itemID="{25DE574B-2CD2-4078-9BEA-2A14717D9698}">
   <ds:schemaRefs>
     <ds:schemaRef ds:uri="514a554b-82b0-4359-b247-fc84018a95f0"/>
@@ -36172,29 +36188,10 @@
 </ds:datastoreItem>
 </file>
 
-<file path=customXml/itemProps2.xml><?xml version="1.0" encoding="utf-8"?>
+<file path=customXml/itemProps3.xml><?xml version="1.0" encoding="utf-8"?>
 <ds:datastoreItem xmlns:ds="http://schemas.openxmlformats.org/officeDocument/2006/customXml" ds:itemID="{B00FC41E-FBDE-42E2-B58A-20EBD240A376}">
   <ds:schemaRefs>
     <ds:schemaRef ds:uri="http://schemas.microsoft.com/sharepoint/v3/contenttype/forms"/>
   </ds:schemaRefs>
 </ds:datastoreItem>
-</file>
-
-<file path=customXml/itemProps3.xml><?xml version="1.0" encoding="utf-8"?>
-<ds:datastoreItem xmlns:ds="http://schemas.openxmlformats.org/officeDocument/2006/customXml" ds:itemID="{1952AB1B-D807-48E4-B821-205D428E3F5C}">
-  <ds:schemaRefs>
-    <ds:schemaRef ds:uri="http://schemas.microsoft.com/office/2006/metadata/contentType"/>
-    <ds:schemaRef ds:uri="http://schemas.microsoft.com/office/2006/metadata/properties/metaAttributes"/>
-    <ds:schemaRef ds:uri="http://www.w3.org/2001/XMLSchema"/>
-    <ds:schemaRef ds:uri="http://schemas.microsoft.com/office/2006/metadata/properties"/>
-    <ds:schemaRef ds:uri="ef624bc2-1644-4d69-8362-5c28ca496374"/>
-    <ds:schemaRef ds:uri="514a554b-82b0-4359-b247-fc84018a95f0"/>
-    <ds:schemaRef ds:uri="http://schemas.microsoft.com/office/2006/documentManagement/types"/>
-    <ds:schemaRef ds:uri="http://schemas.microsoft.com/office/infopath/2007/PartnerControls"/>
-    <ds:schemaRef ds:uri="http://schemas.openxmlformats.org/package/2006/metadata/core-properties"/>
-    <ds:schemaRef ds:uri="http://purl.org/dc/elements/1.1/"/>
-    <ds:schemaRef ds:uri="http://purl.org/dc/terms/"/>
-    <ds:schemaRef ds:uri="http://schemas.microsoft.com/internal/obd"/>
-  </ds:schemaRefs>
-</ds:datastoreItem>
 </file>
</xml_diff>